<commit_message>
ajuste no modelo dominio
</commit_message>
<xml_diff>
--- a/DocumentacaoProjeto/Modelo de Domínio.pptx
+++ b/DocumentacaoProjeto/Modelo de Domínio.pptx
@@ -106,7 +106,7 @@
   </p:defaultTextStyle>
   <p:extLst>
     <p:ext uri="{EFAFB233-063F-42B5-8137-9DF3F51BA10A}">
-      <p15:sldGuideLst xmlns:p15="http://schemas.microsoft.com/office/powerpoint/2012/main">
+      <p15:sldGuideLst xmlns:p15="http://schemas.microsoft.com/office/powerpoint/2012/main" xmlns="">
         <p15:guide id="1" orient="horz" pos="2160">
           <p15:clr>
             <a:srgbClr val="A4A3A4"/>
@@ -252,7 +252,7 @@
           <a:p>
             <a:fld id="{2B5CD499-B16D-46A3-97FB-3CF4304E903E}" type="datetimeFigureOut">
               <a:rPr lang="pt-BR" smtClean="0"/>
-              <a:t>30/03/2020</a:t>
+              <a:t>03/04/2020</a:t>
             </a:fld>
             <a:endParaRPr lang="pt-BR"/>
           </a:p>
@@ -420,7 +420,7 @@
           <a:p>
             <a:fld id="{2B5CD499-B16D-46A3-97FB-3CF4304E903E}" type="datetimeFigureOut">
               <a:rPr lang="pt-BR" smtClean="0"/>
-              <a:t>30/03/2020</a:t>
+              <a:t>03/04/2020</a:t>
             </a:fld>
             <a:endParaRPr lang="pt-BR"/>
           </a:p>
@@ -598,7 +598,7 @@
           <a:p>
             <a:fld id="{2B5CD499-B16D-46A3-97FB-3CF4304E903E}" type="datetimeFigureOut">
               <a:rPr lang="pt-BR" smtClean="0"/>
-              <a:t>30/03/2020</a:t>
+              <a:t>03/04/2020</a:t>
             </a:fld>
             <a:endParaRPr lang="pt-BR"/>
           </a:p>
@@ -766,7 +766,7 @@
           <a:p>
             <a:fld id="{2B5CD499-B16D-46A3-97FB-3CF4304E903E}" type="datetimeFigureOut">
               <a:rPr lang="pt-BR" smtClean="0"/>
-              <a:t>30/03/2020</a:t>
+              <a:t>03/04/2020</a:t>
             </a:fld>
             <a:endParaRPr lang="pt-BR"/>
           </a:p>
@@ -1011,7 +1011,7 @@
           <a:p>
             <a:fld id="{2B5CD499-B16D-46A3-97FB-3CF4304E903E}" type="datetimeFigureOut">
               <a:rPr lang="pt-BR" smtClean="0"/>
-              <a:t>30/03/2020</a:t>
+              <a:t>03/04/2020</a:t>
             </a:fld>
             <a:endParaRPr lang="pt-BR"/>
           </a:p>
@@ -1240,7 +1240,7 @@
           <a:p>
             <a:fld id="{2B5CD499-B16D-46A3-97FB-3CF4304E903E}" type="datetimeFigureOut">
               <a:rPr lang="pt-BR" smtClean="0"/>
-              <a:t>30/03/2020</a:t>
+              <a:t>03/04/2020</a:t>
             </a:fld>
             <a:endParaRPr lang="pt-BR"/>
           </a:p>
@@ -1604,7 +1604,7 @@
           <a:p>
             <a:fld id="{2B5CD499-B16D-46A3-97FB-3CF4304E903E}" type="datetimeFigureOut">
               <a:rPr lang="pt-BR" smtClean="0"/>
-              <a:t>30/03/2020</a:t>
+              <a:t>03/04/2020</a:t>
             </a:fld>
             <a:endParaRPr lang="pt-BR"/>
           </a:p>
@@ -1721,7 +1721,7 @@
           <a:p>
             <a:fld id="{2B5CD499-B16D-46A3-97FB-3CF4304E903E}" type="datetimeFigureOut">
               <a:rPr lang="pt-BR" smtClean="0"/>
-              <a:t>30/03/2020</a:t>
+              <a:t>03/04/2020</a:t>
             </a:fld>
             <a:endParaRPr lang="pt-BR"/>
           </a:p>
@@ -1816,7 +1816,7 @@
           <a:p>
             <a:fld id="{2B5CD499-B16D-46A3-97FB-3CF4304E903E}" type="datetimeFigureOut">
               <a:rPr lang="pt-BR" smtClean="0"/>
-              <a:t>30/03/2020</a:t>
+              <a:t>03/04/2020</a:t>
             </a:fld>
             <a:endParaRPr lang="pt-BR"/>
           </a:p>
@@ -2091,7 +2091,7 @@
           <a:p>
             <a:fld id="{2B5CD499-B16D-46A3-97FB-3CF4304E903E}" type="datetimeFigureOut">
               <a:rPr lang="pt-BR" smtClean="0"/>
-              <a:t>30/03/2020</a:t>
+              <a:t>03/04/2020</a:t>
             </a:fld>
             <a:endParaRPr lang="pt-BR"/>
           </a:p>
@@ -2343,7 +2343,7 @@
           <a:p>
             <a:fld id="{2B5CD499-B16D-46A3-97FB-3CF4304E903E}" type="datetimeFigureOut">
               <a:rPr lang="pt-BR" smtClean="0"/>
-              <a:t>30/03/2020</a:t>
+              <a:t>03/04/2020</a:t>
             </a:fld>
             <a:endParaRPr lang="pt-BR"/>
           </a:p>
@@ -2554,7 +2554,7 @@
           <a:p>
             <a:fld id="{2B5CD499-B16D-46A3-97FB-3CF4304E903E}" type="datetimeFigureOut">
               <a:rPr lang="pt-BR" smtClean="0"/>
-              <a:t>30/03/2020</a:t>
+              <a:t>03/04/2020</a:t>
             </a:fld>
             <a:endParaRPr lang="pt-BR"/>
           </a:p>
@@ -3251,171 +3251,6 @@
       </p:sp>
       <p:sp>
         <p:nvSpPr>
-          <p:cNvPr id="10" name="Losango 9"/>
-          <p:cNvSpPr/>
-          <p:nvPr/>
-        </p:nvSpPr>
-        <p:spPr>
-          <a:xfrm>
-            <a:off x="5019008" y="4397769"/>
-            <a:ext cx="197474" cy="203914"/>
-          </a:xfrm>
-          <a:prstGeom prst="diamond">
-            <a:avLst/>
-          </a:prstGeom>
-          <a:noFill/>
-          <a:ln>
-            <a:solidFill>
-              <a:schemeClr val="tx1"/>
-            </a:solidFill>
-          </a:ln>
-        </p:spPr>
-        <p:style>
-          <a:lnRef idx="2">
-            <a:schemeClr val="accent1">
-              <a:shade val="50000"/>
-            </a:schemeClr>
-          </a:lnRef>
-          <a:fillRef idx="1">
-            <a:schemeClr val="accent1"/>
-          </a:fillRef>
-          <a:effectRef idx="0">
-            <a:schemeClr val="accent1"/>
-          </a:effectRef>
-          <a:fontRef idx="minor">
-            <a:schemeClr val="lt1"/>
-          </a:fontRef>
-        </p:style>
-        <p:txBody>
-          <a:bodyPr rot="0" spcFirstLastPara="0" vertOverflow="overflow" horzOverflow="overflow" vert="horz" wrap="square" lIns="91440" tIns="45720" rIns="91440" bIns="45720" numCol="1" spcCol="0" rtlCol="0" fromWordArt="0" anchor="ctr" anchorCtr="0" forceAA="0" compatLnSpc="1">
-            <a:prstTxWarp prst="textNoShape">
-              <a:avLst/>
-            </a:prstTxWarp>
-            <a:noAutofit/>
-          </a:bodyPr>
-          <a:lstStyle/>
-          <a:p>
-            <a:pPr algn="ctr"/>
-            <a:endParaRPr lang="pt-BR" sz="2072"/>
-          </a:p>
-        </p:txBody>
-      </p:sp>
-      <p:cxnSp>
-        <p:nvCxnSpPr>
-          <p:cNvPr id="12" name="Conector reto 11"/>
-          <p:cNvCxnSpPr>
-            <a:stCxn id="4" idx="0"/>
-            <a:endCxn id="10" idx="2"/>
-          </p:cNvCxnSpPr>
-          <p:nvPr/>
-        </p:nvCxnSpPr>
-        <p:spPr>
-          <a:xfrm flipH="1" flipV="1">
-            <a:off x="5117746" y="4601683"/>
-            <a:ext cx="1" cy="965921"/>
-          </a:xfrm>
-          <a:prstGeom prst="line">
-            <a:avLst/>
-          </a:prstGeom>
-          <a:ln>
-            <a:solidFill>
-              <a:schemeClr val="tx1"/>
-            </a:solidFill>
-          </a:ln>
-        </p:spPr>
-        <p:style>
-          <a:lnRef idx="1">
-            <a:schemeClr val="accent1"/>
-          </a:lnRef>
-          <a:fillRef idx="0">
-            <a:schemeClr val="accent1"/>
-          </a:fillRef>
-          <a:effectRef idx="0">
-            <a:schemeClr val="accent1"/>
-          </a:effectRef>
-          <a:fontRef idx="minor">
-            <a:schemeClr val="tx1"/>
-          </a:fontRef>
-        </p:style>
-      </p:cxnSp>
-      <p:cxnSp>
-        <p:nvCxnSpPr>
-          <p:cNvPr id="13" name="Conector reto 12"/>
-          <p:cNvCxnSpPr>
-            <a:stCxn id="5" idx="0"/>
-            <a:endCxn id="10" idx="2"/>
-          </p:cNvCxnSpPr>
-          <p:nvPr/>
-        </p:nvCxnSpPr>
-        <p:spPr>
-          <a:xfrm flipH="1" flipV="1">
-            <a:off x="5117746" y="4601683"/>
-            <a:ext cx="2459867" cy="965921"/>
-          </a:xfrm>
-          <a:prstGeom prst="line">
-            <a:avLst/>
-          </a:prstGeom>
-          <a:ln>
-            <a:solidFill>
-              <a:schemeClr val="tx1"/>
-            </a:solidFill>
-          </a:ln>
-        </p:spPr>
-        <p:style>
-          <a:lnRef idx="1">
-            <a:schemeClr val="accent1"/>
-          </a:lnRef>
-          <a:fillRef idx="0">
-            <a:schemeClr val="accent1"/>
-          </a:fillRef>
-          <a:effectRef idx="0">
-            <a:schemeClr val="accent1"/>
-          </a:effectRef>
-          <a:fontRef idx="minor">
-            <a:schemeClr val="tx1"/>
-          </a:fontRef>
-        </p:style>
-      </p:cxnSp>
-      <p:cxnSp>
-        <p:nvCxnSpPr>
-          <p:cNvPr id="16" name="Conector reto 15"/>
-          <p:cNvCxnSpPr>
-            <a:stCxn id="6" idx="0"/>
-            <a:endCxn id="10" idx="2"/>
-          </p:cNvCxnSpPr>
-          <p:nvPr/>
-        </p:nvCxnSpPr>
-        <p:spPr>
-          <a:xfrm flipV="1">
-            <a:off x="2928339" y="4601683"/>
-            <a:ext cx="2189407" cy="965921"/>
-          </a:xfrm>
-          <a:prstGeom prst="line">
-            <a:avLst/>
-          </a:prstGeom>
-          <a:ln>
-            <a:solidFill>
-              <a:schemeClr val="tx1"/>
-            </a:solidFill>
-          </a:ln>
-        </p:spPr>
-        <p:style>
-          <a:lnRef idx="1">
-            <a:schemeClr val="accent1"/>
-          </a:lnRef>
-          <a:fillRef idx="0">
-            <a:schemeClr val="accent1"/>
-          </a:fillRef>
-          <a:effectRef idx="0">
-            <a:schemeClr val="accent1"/>
-          </a:effectRef>
-          <a:fontRef idx="minor">
-            <a:schemeClr val="tx1"/>
-          </a:fontRef>
-        </p:style>
-      </p:cxnSp>
-      <p:sp>
-        <p:nvSpPr>
           <p:cNvPr id="19" name="Retângulo 18"/>
           <p:cNvSpPr/>
           <p:nvPr/>
@@ -4475,6 +4310,201 @@
           </a:p>
         </p:txBody>
       </p:sp>
+      <p:cxnSp>
+        <p:nvCxnSpPr>
+          <p:cNvPr id="3" name="Conector reto 2"/>
+          <p:cNvCxnSpPr>
+            <a:stCxn id="6" idx="0"/>
+          </p:cNvCxnSpPr>
+          <p:nvPr/>
+        </p:nvCxnSpPr>
+        <p:spPr>
+          <a:xfrm flipH="1" flipV="1">
+            <a:off x="2928338" y="5139559"/>
+            <a:ext cx="1" cy="428044"/>
+          </a:xfrm>
+          <a:prstGeom prst="line">
+            <a:avLst/>
+          </a:prstGeom>
+          <a:ln>
+            <a:solidFill>
+              <a:schemeClr val="tx1"/>
+            </a:solidFill>
+          </a:ln>
+        </p:spPr>
+        <p:style>
+          <a:lnRef idx="1">
+            <a:schemeClr val="accent1"/>
+          </a:lnRef>
+          <a:fillRef idx="0">
+            <a:schemeClr val="accent1"/>
+          </a:fillRef>
+          <a:effectRef idx="0">
+            <a:schemeClr val="accent1"/>
+          </a:effectRef>
+          <a:fontRef idx="minor">
+            <a:schemeClr val="tx1"/>
+          </a:fontRef>
+        </p:style>
+      </p:cxnSp>
+      <p:cxnSp>
+        <p:nvCxnSpPr>
+          <p:cNvPr id="17" name="Conector reto 16"/>
+          <p:cNvCxnSpPr>
+            <a:stCxn id="5" idx="0"/>
+          </p:cNvCxnSpPr>
+          <p:nvPr/>
+        </p:nvCxnSpPr>
+        <p:spPr>
+          <a:xfrm flipH="1" flipV="1">
+            <a:off x="7577612" y="5139559"/>
+            <a:ext cx="1" cy="428044"/>
+          </a:xfrm>
+          <a:prstGeom prst="line">
+            <a:avLst/>
+          </a:prstGeom>
+          <a:ln>
+            <a:solidFill>
+              <a:schemeClr val="tx1"/>
+            </a:solidFill>
+          </a:ln>
+        </p:spPr>
+        <p:style>
+          <a:lnRef idx="1">
+            <a:schemeClr val="accent1"/>
+          </a:lnRef>
+          <a:fillRef idx="0">
+            <a:schemeClr val="accent1"/>
+          </a:fillRef>
+          <a:effectRef idx="0">
+            <a:schemeClr val="accent1"/>
+          </a:effectRef>
+          <a:fontRef idx="minor">
+            <a:schemeClr val="tx1"/>
+          </a:fontRef>
+        </p:style>
+      </p:cxnSp>
+      <p:cxnSp>
+        <p:nvCxnSpPr>
+          <p:cNvPr id="39" name="Conector reto 38"/>
+          <p:cNvCxnSpPr/>
+          <p:nvPr/>
+        </p:nvCxnSpPr>
+        <p:spPr>
+          <a:xfrm>
+            <a:off x="2928340" y="5139559"/>
+            <a:ext cx="4649273" cy="0"/>
+          </a:xfrm>
+          <a:prstGeom prst="line">
+            <a:avLst/>
+          </a:prstGeom>
+          <a:ln>
+            <a:solidFill>
+              <a:schemeClr val="tx1"/>
+            </a:solidFill>
+          </a:ln>
+        </p:spPr>
+        <p:style>
+          <a:lnRef idx="1">
+            <a:schemeClr val="accent1"/>
+          </a:lnRef>
+          <a:fillRef idx="0">
+            <a:schemeClr val="accent1"/>
+          </a:fillRef>
+          <a:effectRef idx="0">
+            <a:schemeClr val="accent1"/>
+          </a:effectRef>
+          <a:fontRef idx="minor">
+            <a:schemeClr val="tx1"/>
+          </a:fontRef>
+        </p:style>
+      </p:cxnSp>
+      <p:sp>
+        <p:nvSpPr>
+          <p:cNvPr id="40" name="Triângulo isósceles 39"/>
+          <p:cNvSpPr/>
+          <p:nvPr/>
+        </p:nvSpPr>
+        <p:spPr>
+          <a:xfrm>
+            <a:off x="5006640" y="4417081"/>
+            <a:ext cx="212452" cy="205095"/>
+          </a:xfrm>
+          <a:prstGeom prst="triangle">
+            <a:avLst/>
+          </a:prstGeom>
+          <a:solidFill>
+            <a:schemeClr val="bg1"/>
+          </a:solidFill>
+          <a:ln>
+            <a:solidFill>
+              <a:schemeClr val="tx1"/>
+            </a:solidFill>
+          </a:ln>
+        </p:spPr>
+        <p:style>
+          <a:lnRef idx="2">
+            <a:schemeClr val="accent1">
+              <a:shade val="50000"/>
+            </a:schemeClr>
+          </a:lnRef>
+          <a:fillRef idx="1">
+            <a:schemeClr val="accent1"/>
+          </a:fillRef>
+          <a:effectRef idx="0">
+            <a:schemeClr val="accent1"/>
+          </a:effectRef>
+          <a:fontRef idx="minor">
+            <a:schemeClr val="lt1"/>
+          </a:fontRef>
+        </p:style>
+        <p:txBody>
+          <a:bodyPr rtlCol="0" anchor="ctr"/>
+          <a:lstStyle/>
+          <a:p>
+            <a:pPr algn="ctr"/>
+            <a:endParaRPr lang="pt-BR"/>
+          </a:p>
+        </p:txBody>
+      </p:sp>
+      <p:cxnSp>
+        <p:nvCxnSpPr>
+          <p:cNvPr id="47" name="Conector reto 46"/>
+          <p:cNvCxnSpPr>
+            <a:stCxn id="4" idx="0"/>
+            <a:endCxn id="40" idx="3"/>
+          </p:cNvCxnSpPr>
+          <p:nvPr/>
+        </p:nvCxnSpPr>
+        <p:spPr>
+          <a:xfrm flipH="1" flipV="1">
+            <a:off x="5112866" y="4622176"/>
+            <a:ext cx="4880" cy="945427"/>
+          </a:xfrm>
+          <a:prstGeom prst="line">
+            <a:avLst/>
+          </a:prstGeom>
+          <a:ln>
+            <a:solidFill>
+              <a:schemeClr val="tx1"/>
+            </a:solidFill>
+          </a:ln>
+        </p:spPr>
+        <p:style>
+          <a:lnRef idx="1">
+            <a:schemeClr val="accent1"/>
+          </a:lnRef>
+          <a:fillRef idx="0">
+            <a:schemeClr val="accent1"/>
+          </a:fillRef>
+          <a:effectRef idx="0">
+            <a:schemeClr val="accent1"/>
+          </a:effectRef>
+          <a:fontRef idx="minor">
+            <a:schemeClr val="tx1"/>
+          </a:fontRef>
+        </p:style>
+      </p:cxnSp>
     </p:spTree>
     <p:extLst>
       <p:ext uri="{BB962C8B-B14F-4D97-AF65-F5344CB8AC3E}">
@@ -4743,7 +4773,7 @@
   <a:extraClrSchemeLst/>
   <a:extLst>
     <a:ext uri="{05A4C25C-085E-4340-85A3-A5531E510DB2}">
-      <thm15:themeFamily xmlns:thm15="http://schemas.microsoft.com/office/thememl/2012/main" name="Office Theme" id="{62F939B6-93AF-4DB8-9C6B-D6C7DFDC589F}" vid="{4A3C46E8-61CC-4603-A589-7422A47A8E4A}"/>
+      <thm15:themeFamily xmlns:thm15="http://schemas.microsoft.com/office/thememl/2012/main" xmlns="" name="Office Theme" id="{62F939B6-93AF-4DB8-9C6B-D6C7DFDC589F}" vid="{4A3C46E8-61CC-4603-A589-7422A47A8E4A}"/>
     </a:ext>
   </a:extLst>
 </a:theme>

</xml_diff>

<commit_message>
atualização Modelo de Domínio
</commit_message>
<xml_diff>
--- a/DocumentacaoProjeto/Modelo de Domínio.pptx
+++ b/DocumentacaoProjeto/Modelo de Domínio.pptx
@@ -106,7 +106,7 @@
   </p:defaultTextStyle>
   <p:extLst>
     <p:ext uri="{EFAFB233-063F-42B5-8137-9DF3F51BA10A}">
-      <p15:sldGuideLst xmlns:p15="http://schemas.microsoft.com/office/powerpoint/2012/main" xmlns="">
+      <p15:sldGuideLst xmlns:p15="http://schemas.microsoft.com/office/powerpoint/2012/main">
         <p15:guide id="1" orient="horz" pos="2160">
           <p15:clr>
             <a:srgbClr val="A4A3A4"/>
@@ -252,7 +252,7 @@
           <a:p>
             <a:fld id="{2B5CD499-B16D-46A3-97FB-3CF4304E903E}" type="datetimeFigureOut">
               <a:rPr lang="pt-BR" smtClean="0"/>
-              <a:t>03/04/2020</a:t>
+              <a:t>05/04/2020</a:t>
             </a:fld>
             <a:endParaRPr lang="pt-BR"/>
           </a:p>
@@ -420,7 +420,7 @@
           <a:p>
             <a:fld id="{2B5CD499-B16D-46A3-97FB-3CF4304E903E}" type="datetimeFigureOut">
               <a:rPr lang="pt-BR" smtClean="0"/>
-              <a:t>03/04/2020</a:t>
+              <a:t>05/04/2020</a:t>
             </a:fld>
             <a:endParaRPr lang="pt-BR"/>
           </a:p>
@@ -598,7 +598,7 @@
           <a:p>
             <a:fld id="{2B5CD499-B16D-46A3-97FB-3CF4304E903E}" type="datetimeFigureOut">
               <a:rPr lang="pt-BR" smtClean="0"/>
-              <a:t>03/04/2020</a:t>
+              <a:t>05/04/2020</a:t>
             </a:fld>
             <a:endParaRPr lang="pt-BR"/>
           </a:p>
@@ -766,7 +766,7 @@
           <a:p>
             <a:fld id="{2B5CD499-B16D-46A3-97FB-3CF4304E903E}" type="datetimeFigureOut">
               <a:rPr lang="pt-BR" smtClean="0"/>
-              <a:t>03/04/2020</a:t>
+              <a:t>05/04/2020</a:t>
             </a:fld>
             <a:endParaRPr lang="pt-BR"/>
           </a:p>
@@ -1011,7 +1011,7 @@
           <a:p>
             <a:fld id="{2B5CD499-B16D-46A3-97FB-3CF4304E903E}" type="datetimeFigureOut">
               <a:rPr lang="pt-BR" smtClean="0"/>
-              <a:t>03/04/2020</a:t>
+              <a:t>05/04/2020</a:t>
             </a:fld>
             <a:endParaRPr lang="pt-BR"/>
           </a:p>
@@ -1240,7 +1240,7 @@
           <a:p>
             <a:fld id="{2B5CD499-B16D-46A3-97FB-3CF4304E903E}" type="datetimeFigureOut">
               <a:rPr lang="pt-BR" smtClean="0"/>
-              <a:t>03/04/2020</a:t>
+              <a:t>05/04/2020</a:t>
             </a:fld>
             <a:endParaRPr lang="pt-BR"/>
           </a:p>
@@ -1604,7 +1604,7 @@
           <a:p>
             <a:fld id="{2B5CD499-B16D-46A3-97FB-3CF4304E903E}" type="datetimeFigureOut">
               <a:rPr lang="pt-BR" smtClean="0"/>
-              <a:t>03/04/2020</a:t>
+              <a:t>05/04/2020</a:t>
             </a:fld>
             <a:endParaRPr lang="pt-BR"/>
           </a:p>
@@ -1721,7 +1721,7 @@
           <a:p>
             <a:fld id="{2B5CD499-B16D-46A3-97FB-3CF4304E903E}" type="datetimeFigureOut">
               <a:rPr lang="pt-BR" smtClean="0"/>
-              <a:t>03/04/2020</a:t>
+              <a:t>05/04/2020</a:t>
             </a:fld>
             <a:endParaRPr lang="pt-BR"/>
           </a:p>
@@ -1816,7 +1816,7 @@
           <a:p>
             <a:fld id="{2B5CD499-B16D-46A3-97FB-3CF4304E903E}" type="datetimeFigureOut">
               <a:rPr lang="pt-BR" smtClean="0"/>
-              <a:t>03/04/2020</a:t>
+              <a:t>05/04/2020</a:t>
             </a:fld>
             <a:endParaRPr lang="pt-BR"/>
           </a:p>
@@ -2091,7 +2091,7 @@
           <a:p>
             <a:fld id="{2B5CD499-B16D-46A3-97FB-3CF4304E903E}" type="datetimeFigureOut">
               <a:rPr lang="pt-BR" smtClean="0"/>
-              <a:t>03/04/2020</a:t>
+              <a:t>05/04/2020</a:t>
             </a:fld>
             <a:endParaRPr lang="pt-BR"/>
           </a:p>
@@ -2343,7 +2343,7 @@
           <a:p>
             <a:fld id="{2B5CD499-B16D-46A3-97FB-3CF4304E903E}" type="datetimeFigureOut">
               <a:rPr lang="pt-BR" smtClean="0"/>
-              <a:t>03/04/2020</a:t>
+              <a:t>05/04/2020</a:t>
             </a:fld>
             <a:endParaRPr lang="pt-BR"/>
           </a:p>
@@ -2554,7 +2554,7 @@
           <a:p>
             <a:fld id="{2B5CD499-B16D-46A3-97FB-3CF4304E903E}" type="datetimeFigureOut">
               <a:rPr lang="pt-BR" smtClean="0"/>
-              <a:t>03/04/2020</a:t>
+              <a:t>05/04/2020</a:t>
             </a:fld>
             <a:endParaRPr lang="pt-BR"/>
           </a:p>
@@ -4505,6 +4505,386 @@
           </a:fontRef>
         </p:style>
       </p:cxnSp>
+      <p:sp>
+        <p:nvSpPr>
+          <p:cNvPr id="34" name="Retângulo 33"/>
+          <p:cNvSpPr/>
+          <p:nvPr/>
+        </p:nvSpPr>
+        <p:spPr>
+          <a:xfrm>
+            <a:off x="8092765" y="509586"/>
+            <a:ext cx="1429555" cy="708338"/>
+          </a:xfrm>
+          <a:prstGeom prst="rect">
+            <a:avLst/>
+          </a:prstGeom>
+          <a:noFill/>
+          <a:ln>
+            <a:solidFill>
+              <a:schemeClr val="tx1"/>
+            </a:solidFill>
+          </a:ln>
+        </p:spPr>
+        <p:style>
+          <a:lnRef idx="2">
+            <a:schemeClr val="accent1">
+              <a:shade val="50000"/>
+            </a:schemeClr>
+          </a:lnRef>
+          <a:fillRef idx="1">
+            <a:schemeClr val="accent1"/>
+          </a:fillRef>
+          <a:effectRef idx="0">
+            <a:schemeClr val="accent1"/>
+          </a:effectRef>
+          <a:fontRef idx="minor">
+            <a:schemeClr val="lt1"/>
+          </a:fontRef>
+        </p:style>
+        <p:txBody>
+          <a:bodyPr rot="0" spcFirstLastPara="0" vertOverflow="overflow" horzOverflow="overflow" vert="horz" wrap="square" lIns="91440" tIns="45720" rIns="91440" bIns="45720" numCol="1" spcCol="0" rtlCol="0" fromWordArt="0" anchor="ctr" anchorCtr="0" forceAA="0" compatLnSpc="1">
+            <a:prstTxWarp prst="textNoShape">
+              <a:avLst/>
+            </a:prstTxWarp>
+            <a:noAutofit/>
+          </a:bodyPr>
+          <a:lstStyle/>
+          <a:p>
+            <a:pPr algn="ctr"/>
+            <a:r>
+              <a:rPr lang="pt-BR" dirty="0" smtClean="0">
+                <a:solidFill>
+                  <a:schemeClr val="tx1"/>
+                </a:solidFill>
+              </a:rPr>
+              <a:t>Configuração</a:t>
+            </a:r>
+            <a:endParaRPr lang="pt-BR" dirty="0">
+              <a:solidFill>
+                <a:schemeClr val="tx1"/>
+              </a:solidFill>
+            </a:endParaRPr>
+          </a:p>
+        </p:txBody>
+      </p:sp>
+      <p:sp>
+        <p:nvSpPr>
+          <p:cNvPr id="36" name="Retângulo 35"/>
+          <p:cNvSpPr/>
+          <p:nvPr/>
+        </p:nvSpPr>
+        <p:spPr>
+          <a:xfrm>
+            <a:off x="7169332" y="1859040"/>
+            <a:ext cx="1429555" cy="708338"/>
+          </a:xfrm>
+          <a:prstGeom prst="rect">
+            <a:avLst/>
+          </a:prstGeom>
+          <a:noFill/>
+          <a:ln>
+            <a:solidFill>
+              <a:schemeClr val="tx1"/>
+            </a:solidFill>
+          </a:ln>
+        </p:spPr>
+        <p:style>
+          <a:lnRef idx="2">
+            <a:schemeClr val="accent1">
+              <a:shade val="50000"/>
+            </a:schemeClr>
+          </a:lnRef>
+          <a:fillRef idx="1">
+            <a:schemeClr val="accent1"/>
+          </a:fillRef>
+          <a:effectRef idx="0">
+            <a:schemeClr val="accent1"/>
+          </a:effectRef>
+          <a:fontRef idx="minor">
+            <a:schemeClr val="lt1"/>
+          </a:fontRef>
+        </p:style>
+        <p:txBody>
+          <a:bodyPr rot="0" spcFirstLastPara="0" vertOverflow="overflow" horzOverflow="overflow" vert="horz" wrap="square" lIns="91440" tIns="45720" rIns="91440" bIns="45720" numCol="1" spcCol="0" rtlCol="0" fromWordArt="0" anchor="ctr" anchorCtr="0" forceAA="0" compatLnSpc="1">
+            <a:prstTxWarp prst="textNoShape">
+              <a:avLst/>
+            </a:prstTxWarp>
+            <a:noAutofit/>
+          </a:bodyPr>
+          <a:lstStyle/>
+          <a:p>
+            <a:pPr algn="ctr"/>
+            <a:r>
+              <a:rPr lang="pt-BR" dirty="0" smtClean="0">
+                <a:solidFill>
+                  <a:schemeClr val="tx1"/>
+                </a:solidFill>
+              </a:rPr>
+              <a:t>Musica</a:t>
+            </a:r>
+            <a:endParaRPr lang="pt-BR" dirty="0">
+              <a:solidFill>
+                <a:schemeClr val="tx1"/>
+              </a:solidFill>
+            </a:endParaRPr>
+          </a:p>
+        </p:txBody>
+      </p:sp>
+      <p:sp>
+        <p:nvSpPr>
+          <p:cNvPr id="41" name="Retângulo 40"/>
+          <p:cNvSpPr/>
+          <p:nvPr/>
+        </p:nvSpPr>
+        <p:spPr>
+          <a:xfrm>
+            <a:off x="9193906" y="1867948"/>
+            <a:ext cx="1429555" cy="708338"/>
+          </a:xfrm>
+          <a:prstGeom prst="rect">
+            <a:avLst/>
+          </a:prstGeom>
+          <a:noFill/>
+          <a:ln>
+            <a:solidFill>
+              <a:schemeClr val="tx1"/>
+            </a:solidFill>
+          </a:ln>
+        </p:spPr>
+        <p:style>
+          <a:lnRef idx="2">
+            <a:schemeClr val="accent1">
+              <a:shade val="50000"/>
+            </a:schemeClr>
+          </a:lnRef>
+          <a:fillRef idx="1">
+            <a:schemeClr val="accent1"/>
+          </a:fillRef>
+          <a:effectRef idx="0">
+            <a:schemeClr val="accent1"/>
+          </a:effectRef>
+          <a:fontRef idx="minor">
+            <a:schemeClr val="lt1"/>
+          </a:fontRef>
+        </p:style>
+        <p:txBody>
+          <a:bodyPr rot="0" spcFirstLastPara="0" vertOverflow="overflow" horzOverflow="overflow" vert="horz" wrap="square" lIns="91440" tIns="45720" rIns="91440" bIns="45720" numCol="1" spcCol="0" rtlCol="0" fromWordArt="0" anchor="ctr" anchorCtr="0" forceAA="0" compatLnSpc="1">
+            <a:prstTxWarp prst="textNoShape">
+              <a:avLst/>
+            </a:prstTxWarp>
+            <a:noAutofit/>
+          </a:bodyPr>
+          <a:lstStyle/>
+          <a:p>
+            <a:pPr algn="ctr"/>
+            <a:r>
+              <a:rPr lang="pt-BR" dirty="0" smtClean="0">
+                <a:solidFill>
+                  <a:schemeClr val="tx1"/>
+                </a:solidFill>
+              </a:rPr>
+              <a:t>Som</a:t>
+            </a:r>
+            <a:endParaRPr lang="pt-BR" dirty="0">
+              <a:solidFill>
+                <a:schemeClr val="tx1"/>
+              </a:solidFill>
+            </a:endParaRPr>
+          </a:p>
+        </p:txBody>
+      </p:sp>
+      <p:sp>
+        <p:nvSpPr>
+          <p:cNvPr id="42" name="Losango 41"/>
+          <p:cNvSpPr/>
+          <p:nvPr/>
+        </p:nvSpPr>
+        <p:spPr>
+          <a:xfrm>
+            <a:off x="8707407" y="1200845"/>
+            <a:ext cx="197474" cy="203914"/>
+          </a:xfrm>
+          <a:prstGeom prst="diamond">
+            <a:avLst/>
+          </a:prstGeom>
+          <a:noFill/>
+          <a:ln>
+            <a:solidFill>
+              <a:schemeClr val="tx1"/>
+            </a:solidFill>
+          </a:ln>
+        </p:spPr>
+        <p:style>
+          <a:lnRef idx="2">
+            <a:schemeClr val="accent1">
+              <a:shade val="50000"/>
+            </a:schemeClr>
+          </a:lnRef>
+          <a:fillRef idx="1">
+            <a:schemeClr val="accent1"/>
+          </a:fillRef>
+          <a:effectRef idx="0">
+            <a:schemeClr val="accent1"/>
+          </a:effectRef>
+          <a:fontRef idx="minor">
+            <a:schemeClr val="lt1"/>
+          </a:fontRef>
+        </p:style>
+        <p:txBody>
+          <a:bodyPr rot="0" spcFirstLastPara="0" vertOverflow="overflow" horzOverflow="overflow" vert="horz" wrap="square" lIns="91440" tIns="45720" rIns="91440" bIns="45720" numCol="1" spcCol="0" rtlCol="0" fromWordArt="0" anchor="ctr" anchorCtr="0" forceAA="0" compatLnSpc="1">
+            <a:prstTxWarp prst="textNoShape">
+              <a:avLst/>
+            </a:prstTxWarp>
+            <a:noAutofit/>
+          </a:bodyPr>
+          <a:lstStyle/>
+          <a:p>
+            <a:pPr algn="ctr"/>
+            <a:endParaRPr lang="pt-BR" sz="2072"/>
+          </a:p>
+        </p:txBody>
+      </p:sp>
+      <p:cxnSp>
+        <p:nvCxnSpPr>
+          <p:cNvPr id="43" name="Conector reto 42"/>
+          <p:cNvCxnSpPr/>
+          <p:nvPr/>
+        </p:nvCxnSpPr>
+        <p:spPr>
+          <a:xfrm flipV="1">
+            <a:off x="8806144" y="1404760"/>
+            <a:ext cx="0" cy="226513"/>
+          </a:xfrm>
+          <a:prstGeom prst="line">
+            <a:avLst/>
+          </a:prstGeom>
+          <a:ln>
+            <a:solidFill>
+              <a:schemeClr val="tx1"/>
+            </a:solidFill>
+          </a:ln>
+        </p:spPr>
+        <p:style>
+          <a:lnRef idx="1">
+            <a:schemeClr val="accent1"/>
+          </a:lnRef>
+          <a:fillRef idx="0">
+            <a:schemeClr val="accent1"/>
+          </a:fillRef>
+          <a:effectRef idx="0">
+            <a:schemeClr val="accent1"/>
+          </a:effectRef>
+          <a:fontRef idx="minor">
+            <a:schemeClr val="tx1"/>
+          </a:fontRef>
+        </p:style>
+      </p:cxnSp>
+      <p:cxnSp>
+        <p:nvCxnSpPr>
+          <p:cNvPr id="44" name="Conector reto 43"/>
+          <p:cNvCxnSpPr/>
+          <p:nvPr/>
+        </p:nvCxnSpPr>
+        <p:spPr>
+          <a:xfrm>
+            <a:off x="7884110" y="1641435"/>
+            <a:ext cx="2041541" cy="4259"/>
+          </a:xfrm>
+          <a:prstGeom prst="line">
+            <a:avLst/>
+          </a:prstGeom>
+          <a:ln>
+            <a:solidFill>
+              <a:schemeClr val="tx1"/>
+            </a:solidFill>
+          </a:ln>
+        </p:spPr>
+        <p:style>
+          <a:lnRef idx="1">
+            <a:schemeClr val="accent1"/>
+          </a:lnRef>
+          <a:fillRef idx="0">
+            <a:schemeClr val="accent1"/>
+          </a:fillRef>
+          <a:effectRef idx="0">
+            <a:schemeClr val="accent1"/>
+          </a:effectRef>
+          <a:fontRef idx="minor">
+            <a:schemeClr val="tx1"/>
+          </a:fontRef>
+        </p:style>
+      </p:cxnSp>
+      <p:cxnSp>
+        <p:nvCxnSpPr>
+          <p:cNvPr id="46" name="Conector reto 45"/>
+          <p:cNvCxnSpPr/>
+          <p:nvPr/>
+        </p:nvCxnSpPr>
+        <p:spPr>
+          <a:xfrm flipV="1">
+            <a:off x="7884110" y="1631273"/>
+            <a:ext cx="0" cy="226513"/>
+          </a:xfrm>
+          <a:prstGeom prst="line">
+            <a:avLst/>
+          </a:prstGeom>
+          <a:ln>
+            <a:solidFill>
+              <a:schemeClr val="tx1"/>
+            </a:solidFill>
+          </a:ln>
+        </p:spPr>
+        <p:style>
+          <a:lnRef idx="1">
+            <a:schemeClr val="accent1"/>
+          </a:lnRef>
+          <a:fillRef idx="0">
+            <a:schemeClr val="accent1"/>
+          </a:fillRef>
+          <a:effectRef idx="0">
+            <a:schemeClr val="accent1"/>
+          </a:effectRef>
+          <a:fontRef idx="minor">
+            <a:schemeClr val="tx1"/>
+          </a:fontRef>
+        </p:style>
+      </p:cxnSp>
+      <p:cxnSp>
+        <p:nvCxnSpPr>
+          <p:cNvPr id="48" name="Conector reto 47"/>
+          <p:cNvCxnSpPr/>
+          <p:nvPr/>
+        </p:nvCxnSpPr>
+        <p:spPr>
+          <a:xfrm flipV="1">
+            <a:off x="9912865" y="1641435"/>
+            <a:ext cx="0" cy="226513"/>
+          </a:xfrm>
+          <a:prstGeom prst="line">
+            <a:avLst/>
+          </a:prstGeom>
+          <a:ln>
+            <a:solidFill>
+              <a:schemeClr val="tx1"/>
+            </a:solidFill>
+          </a:ln>
+        </p:spPr>
+        <p:style>
+          <a:lnRef idx="1">
+            <a:schemeClr val="accent1"/>
+          </a:lnRef>
+          <a:fillRef idx="0">
+            <a:schemeClr val="accent1"/>
+          </a:fillRef>
+          <a:effectRef idx="0">
+            <a:schemeClr val="accent1"/>
+          </a:effectRef>
+          <a:fontRef idx="minor">
+            <a:schemeClr val="tx1"/>
+          </a:fontRef>
+        </p:style>
+      </p:cxnSp>
     </p:spTree>
     <p:extLst>
       <p:ext uri="{BB962C8B-B14F-4D97-AF65-F5344CB8AC3E}">
@@ -4773,7 +5153,7 @@
   <a:extraClrSchemeLst/>
   <a:extLst>
     <a:ext uri="{05A4C25C-085E-4340-85A3-A5531E510DB2}">
-      <thm15:themeFamily xmlns:thm15="http://schemas.microsoft.com/office/thememl/2012/main" xmlns="" name="Office Theme" id="{62F939B6-93AF-4DB8-9C6B-D6C7DFDC589F}" vid="{4A3C46E8-61CC-4603-A589-7422A47A8E4A}"/>
+      <thm15:themeFamily xmlns:thm15="http://schemas.microsoft.com/office/thememl/2012/main" name="Office Theme" id="{62F939B6-93AF-4DB8-9C6B-D6C7DFDC589F}" vid="{4A3C46E8-61CC-4603-A589-7422A47A8E4A}"/>
     </a:ext>
   </a:extLst>
 </a:theme>

</xml_diff>